<commit_message>
Teste nome e fonte
</commit_message>
<xml_diff>
--- a/OSP.pptx
+++ b/OSP.pptx
@@ -104,6 +104,11 @@
       </a:defRPr>
     </a:lvl9pPr>
   </p:defaultTextStyle>
+  <p:extLst>
+    <p:ext uri="{EFAFB233-063F-42B5-8137-9DF3F51BA10A}">
+      <p15:sldGuideLst xmlns:p15="http://schemas.microsoft.com/office/powerpoint/2012/main"/>
+    </p:ext>
+  </p:extLst>
 </p:presentation>
 </file>
 
@@ -149,7 +154,7 @@
           </a:lstStyle>
           <a:p>
             <a:r>
-              <a:rPr lang="pt-BR" smtClean="0"/>
+              <a:rPr lang="pt-BR"/>
               <a:t>Clique para editar estilo do título mestre</a:t>
             </a:r>
             <a:endParaRPr lang="en-US" dirty="0"/>
@@ -214,7 +219,7 @@
           </a:lstStyle>
           <a:p>
             <a:r>
-              <a:rPr lang="pt-BR" smtClean="0"/>
+              <a:rPr lang="pt-BR"/>
               <a:t>Clique para editar o estilo do subtítulo mestre</a:t>
             </a:r>
             <a:endParaRPr lang="en-US" dirty="0"/>
@@ -238,7 +243,7 @@
           <a:p>
             <a:fld id="{A2012631-E70B-D040-BE44-60C2DACBB81E}" type="datetimeFigureOut">
               <a:rPr lang="pt-BR" smtClean="0"/>
-              <a:t>05/09/2019</a:t>
+              <a:t>07/09/2019</a:t>
             </a:fld>
             <a:endParaRPr lang="pt-BR"/>
           </a:p>
@@ -280,7 +285,7 @@
           <a:p>
             <a:fld id="{FA791A00-6D8C-5341-8E22-21E34B293C4C}" type="slidenum">
               <a:rPr lang="pt-BR" smtClean="0"/>
-              <a:t>‹n.º›</a:t>
+              <a:t>‹nº›</a:t>
             </a:fld>
             <a:endParaRPr lang="pt-BR"/>
           </a:p>
@@ -332,7 +337,7 @@
           <a:lstStyle/>
           <a:p>
             <a:r>
-              <a:rPr lang="pt-BR" smtClean="0"/>
+              <a:rPr lang="pt-BR"/>
               <a:t>Clique para editar estilo do título mestre</a:t>
             </a:r>
             <a:endParaRPr lang="en-US" dirty="0"/>
@@ -356,35 +361,35 @@
           <a:p>
             <a:pPr lvl="0"/>
             <a:r>
-              <a:rPr lang="pt-BR" smtClean="0"/>
+              <a:rPr lang="pt-BR"/>
               <a:t>Clique para editar os estilos de texto mestres</a:t>
             </a:r>
           </a:p>
           <a:p>
             <a:pPr lvl="1"/>
             <a:r>
-              <a:rPr lang="pt-BR" smtClean="0"/>
+              <a:rPr lang="pt-BR"/>
               <a:t>Segundo nível</a:t>
             </a:r>
           </a:p>
           <a:p>
             <a:pPr lvl="2"/>
             <a:r>
-              <a:rPr lang="pt-BR" smtClean="0"/>
+              <a:rPr lang="pt-BR"/>
               <a:t>Terceiro nível</a:t>
             </a:r>
           </a:p>
           <a:p>
             <a:pPr lvl="3"/>
             <a:r>
-              <a:rPr lang="pt-BR" smtClean="0"/>
+              <a:rPr lang="pt-BR"/>
               <a:t>Quarto nível</a:t>
             </a:r>
           </a:p>
           <a:p>
             <a:pPr lvl="4"/>
             <a:r>
-              <a:rPr lang="pt-BR" smtClean="0"/>
+              <a:rPr lang="pt-BR"/>
               <a:t>Quinto nível</a:t>
             </a:r>
             <a:endParaRPr lang="en-US" dirty="0"/>
@@ -408,7 +413,7 @@
           <a:p>
             <a:fld id="{A2012631-E70B-D040-BE44-60C2DACBB81E}" type="datetimeFigureOut">
               <a:rPr lang="pt-BR" smtClean="0"/>
-              <a:t>05/09/2019</a:t>
+              <a:t>07/09/2019</a:t>
             </a:fld>
             <a:endParaRPr lang="pt-BR"/>
           </a:p>
@@ -450,7 +455,7 @@
           <a:p>
             <a:fld id="{FA791A00-6D8C-5341-8E22-21E34B293C4C}" type="slidenum">
               <a:rPr lang="pt-BR" smtClean="0"/>
-              <a:t>‹n.º›</a:t>
+              <a:t>‹nº›</a:t>
             </a:fld>
             <a:endParaRPr lang="pt-BR"/>
           </a:p>
@@ -507,7 +512,7 @@
           <a:lstStyle/>
           <a:p>
             <a:r>
-              <a:rPr lang="pt-BR" smtClean="0"/>
+              <a:rPr lang="pt-BR"/>
               <a:t>Clique para editar estilo do título mestre</a:t>
             </a:r>
             <a:endParaRPr lang="en-US" dirty="0"/>
@@ -536,35 +541,35 @@
           <a:p>
             <a:pPr lvl="0"/>
             <a:r>
-              <a:rPr lang="pt-BR" smtClean="0"/>
+              <a:rPr lang="pt-BR"/>
               <a:t>Clique para editar os estilos de texto mestres</a:t>
             </a:r>
           </a:p>
           <a:p>
             <a:pPr lvl="1"/>
             <a:r>
-              <a:rPr lang="pt-BR" smtClean="0"/>
+              <a:rPr lang="pt-BR"/>
               <a:t>Segundo nível</a:t>
             </a:r>
           </a:p>
           <a:p>
             <a:pPr lvl="2"/>
             <a:r>
-              <a:rPr lang="pt-BR" smtClean="0"/>
+              <a:rPr lang="pt-BR"/>
               <a:t>Terceiro nível</a:t>
             </a:r>
           </a:p>
           <a:p>
             <a:pPr lvl="3"/>
             <a:r>
-              <a:rPr lang="pt-BR" smtClean="0"/>
+              <a:rPr lang="pt-BR"/>
               <a:t>Quarto nível</a:t>
             </a:r>
           </a:p>
           <a:p>
             <a:pPr lvl="4"/>
             <a:r>
-              <a:rPr lang="pt-BR" smtClean="0"/>
+              <a:rPr lang="pt-BR"/>
               <a:t>Quinto nível</a:t>
             </a:r>
             <a:endParaRPr lang="en-US" dirty="0"/>
@@ -588,7 +593,7 @@
           <a:p>
             <a:fld id="{A2012631-E70B-D040-BE44-60C2DACBB81E}" type="datetimeFigureOut">
               <a:rPr lang="pt-BR" smtClean="0"/>
-              <a:t>05/09/2019</a:t>
+              <a:t>07/09/2019</a:t>
             </a:fld>
             <a:endParaRPr lang="pt-BR"/>
           </a:p>
@@ -630,7 +635,7 @@
           <a:p>
             <a:fld id="{FA791A00-6D8C-5341-8E22-21E34B293C4C}" type="slidenum">
               <a:rPr lang="pt-BR" smtClean="0"/>
-              <a:t>‹n.º›</a:t>
+              <a:t>‹nº›</a:t>
             </a:fld>
             <a:endParaRPr lang="pt-BR"/>
           </a:p>
@@ -682,7 +687,7 @@
           <a:lstStyle/>
           <a:p>
             <a:r>
-              <a:rPr lang="pt-BR" smtClean="0"/>
+              <a:rPr lang="pt-BR"/>
               <a:t>Clique para editar estilo do título mestre</a:t>
             </a:r>
             <a:endParaRPr lang="en-US" dirty="0"/>
@@ -706,35 +711,35 @@
           <a:p>
             <a:pPr lvl="0"/>
             <a:r>
-              <a:rPr lang="pt-BR" smtClean="0"/>
+              <a:rPr lang="pt-BR"/>
               <a:t>Clique para editar os estilos de texto mestres</a:t>
             </a:r>
           </a:p>
           <a:p>
             <a:pPr lvl="1"/>
             <a:r>
-              <a:rPr lang="pt-BR" smtClean="0"/>
+              <a:rPr lang="pt-BR"/>
               <a:t>Segundo nível</a:t>
             </a:r>
           </a:p>
           <a:p>
             <a:pPr lvl="2"/>
             <a:r>
-              <a:rPr lang="pt-BR" smtClean="0"/>
+              <a:rPr lang="pt-BR"/>
               <a:t>Terceiro nível</a:t>
             </a:r>
           </a:p>
           <a:p>
             <a:pPr lvl="3"/>
             <a:r>
-              <a:rPr lang="pt-BR" smtClean="0"/>
+              <a:rPr lang="pt-BR"/>
               <a:t>Quarto nível</a:t>
             </a:r>
           </a:p>
           <a:p>
             <a:pPr lvl="4"/>
             <a:r>
-              <a:rPr lang="pt-BR" smtClean="0"/>
+              <a:rPr lang="pt-BR"/>
               <a:t>Quinto nível</a:t>
             </a:r>
             <a:endParaRPr lang="en-US" dirty="0"/>
@@ -758,7 +763,7 @@
           <a:p>
             <a:fld id="{A2012631-E70B-D040-BE44-60C2DACBB81E}" type="datetimeFigureOut">
               <a:rPr lang="pt-BR" smtClean="0"/>
-              <a:t>05/09/2019</a:t>
+              <a:t>07/09/2019</a:t>
             </a:fld>
             <a:endParaRPr lang="pt-BR"/>
           </a:p>
@@ -800,7 +805,7 @@
           <a:p>
             <a:fld id="{FA791A00-6D8C-5341-8E22-21E34B293C4C}" type="slidenum">
               <a:rPr lang="pt-BR" smtClean="0"/>
-              <a:t>‹n.º›</a:t>
+              <a:t>‹nº›</a:t>
             </a:fld>
             <a:endParaRPr lang="pt-BR"/>
           </a:p>
@@ -861,7 +866,7 @@
           </a:lstStyle>
           <a:p>
             <a:r>
-              <a:rPr lang="pt-BR" smtClean="0"/>
+              <a:rPr lang="pt-BR"/>
               <a:t>Clique para editar estilo do título mestre</a:t>
             </a:r>
             <a:endParaRPr lang="en-US" dirty="0"/>
@@ -979,7 +984,7 @@
           <a:p>
             <a:pPr lvl="0"/>
             <a:r>
-              <a:rPr lang="pt-BR" smtClean="0"/>
+              <a:rPr lang="pt-BR"/>
               <a:t>Clique para editar os estilos de texto mestres</a:t>
             </a:r>
           </a:p>
@@ -1002,7 +1007,7 @@
           <a:p>
             <a:fld id="{A2012631-E70B-D040-BE44-60C2DACBB81E}" type="datetimeFigureOut">
               <a:rPr lang="pt-BR" smtClean="0"/>
-              <a:t>05/09/2019</a:t>
+              <a:t>07/09/2019</a:t>
             </a:fld>
             <a:endParaRPr lang="pt-BR"/>
           </a:p>
@@ -1044,7 +1049,7 @@
           <a:p>
             <a:fld id="{FA791A00-6D8C-5341-8E22-21E34B293C4C}" type="slidenum">
               <a:rPr lang="pt-BR" smtClean="0"/>
-              <a:t>‹n.º›</a:t>
+              <a:t>‹nº›</a:t>
             </a:fld>
             <a:endParaRPr lang="pt-BR"/>
           </a:p>
@@ -1096,7 +1101,7 @@
           <a:lstStyle/>
           <a:p>
             <a:r>
-              <a:rPr lang="pt-BR" smtClean="0"/>
+              <a:rPr lang="pt-BR"/>
               <a:t>Clique para editar estilo do título mestre</a:t>
             </a:r>
             <a:endParaRPr lang="en-US" dirty="0"/>
@@ -1125,35 +1130,35 @@
           <a:p>
             <a:pPr lvl="0"/>
             <a:r>
-              <a:rPr lang="pt-BR" smtClean="0"/>
+              <a:rPr lang="pt-BR"/>
               <a:t>Clique para editar os estilos de texto mestres</a:t>
             </a:r>
           </a:p>
           <a:p>
             <a:pPr lvl="1"/>
             <a:r>
-              <a:rPr lang="pt-BR" smtClean="0"/>
+              <a:rPr lang="pt-BR"/>
               <a:t>Segundo nível</a:t>
             </a:r>
           </a:p>
           <a:p>
             <a:pPr lvl="2"/>
             <a:r>
-              <a:rPr lang="pt-BR" smtClean="0"/>
+              <a:rPr lang="pt-BR"/>
               <a:t>Terceiro nível</a:t>
             </a:r>
           </a:p>
           <a:p>
             <a:pPr lvl="3"/>
             <a:r>
-              <a:rPr lang="pt-BR" smtClean="0"/>
+              <a:rPr lang="pt-BR"/>
               <a:t>Quarto nível</a:t>
             </a:r>
           </a:p>
           <a:p>
             <a:pPr lvl="4"/>
             <a:r>
-              <a:rPr lang="pt-BR" smtClean="0"/>
+              <a:rPr lang="pt-BR"/>
               <a:t>Quinto nível</a:t>
             </a:r>
             <a:endParaRPr lang="en-US" dirty="0"/>
@@ -1182,35 +1187,35 @@
           <a:p>
             <a:pPr lvl="0"/>
             <a:r>
-              <a:rPr lang="pt-BR" smtClean="0"/>
+              <a:rPr lang="pt-BR"/>
               <a:t>Clique para editar os estilos de texto mestres</a:t>
             </a:r>
           </a:p>
           <a:p>
             <a:pPr lvl="1"/>
             <a:r>
-              <a:rPr lang="pt-BR" smtClean="0"/>
+              <a:rPr lang="pt-BR"/>
               <a:t>Segundo nível</a:t>
             </a:r>
           </a:p>
           <a:p>
             <a:pPr lvl="2"/>
             <a:r>
-              <a:rPr lang="pt-BR" smtClean="0"/>
+              <a:rPr lang="pt-BR"/>
               <a:t>Terceiro nível</a:t>
             </a:r>
           </a:p>
           <a:p>
             <a:pPr lvl="3"/>
             <a:r>
-              <a:rPr lang="pt-BR" smtClean="0"/>
+              <a:rPr lang="pt-BR"/>
               <a:t>Quarto nível</a:t>
             </a:r>
           </a:p>
           <a:p>
             <a:pPr lvl="4"/>
             <a:r>
-              <a:rPr lang="pt-BR" smtClean="0"/>
+              <a:rPr lang="pt-BR"/>
               <a:t>Quinto nível</a:t>
             </a:r>
             <a:endParaRPr lang="en-US" dirty="0"/>
@@ -1234,7 +1239,7 @@
           <a:p>
             <a:fld id="{A2012631-E70B-D040-BE44-60C2DACBB81E}" type="datetimeFigureOut">
               <a:rPr lang="pt-BR" smtClean="0"/>
-              <a:t>05/09/2019</a:t>
+              <a:t>07/09/2019</a:t>
             </a:fld>
             <a:endParaRPr lang="pt-BR"/>
           </a:p>
@@ -1276,7 +1281,7 @@
           <a:p>
             <a:fld id="{FA791A00-6D8C-5341-8E22-21E34B293C4C}" type="slidenum">
               <a:rPr lang="pt-BR" smtClean="0"/>
-              <a:t>‹n.º›</a:t>
+              <a:t>‹nº›</a:t>
             </a:fld>
             <a:endParaRPr lang="pt-BR"/>
           </a:p>
@@ -1333,7 +1338,7 @@
           <a:lstStyle/>
           <a:p>
             <a:r>
-              <a:rPr lang="pt-BR" smtClean="0"/>
+              <a:rPr lang="pt-BR"/>
               <a:t>Clique para editar estilo do título mestre</a:t>
             </a:r>
             <a:endParaRPr lang="en-US" dirty="0"/>
@@ -1399,7 +1404,7 @@
           <a:p>
             <a:pPr lvl="0"/>
             <a:r>
-              <a:rPr lang="pt-BR" smtClean="0"/>
+              <a:rPr lang="pt-BR"/>
               <a:t>Clique para editar os estilos de texto mestres</a:t>
             </a:r>
           </a:p>
@@ -1427,35 +1432,35 @@
           <a:p>
             <a:pPr lvl="0"/>
             <a:r>
-              <a:rPr lang="pt-BR" smtClean="0"/>
+              <a:rPr lang="pt-BR"/>
               <a:t>Clique para editar os estilos de texto mestres</a:t>
             </a:r>
           </a:p>
           <a:p>
             <a:pPr lvl="1"/>
             <a:r>
-              <a:rPr lang="pt-BR" smtClean="0"/>
+              <a:rPr lang="pt-BR"/>
               <a:t>Segundo nível</a:t>
             </a:r>
           </a:p>
           <a:p>
             <a:pPr lvl="2"/>
             <a:r>
-              <a:rPr lang="pt-BR" smtClean="0"/>
+              <a:rPr lang="pt-BR"/>
               <a:t>Terceiro nível</a:t>
             </a:r>
           </a:p>
           <a:p>
             <a:pPr lvl="3"/>
             <a:r>
-              <a:rPr lang="pt-BR" smtClean="0"/>
+              <a:rPr lang="pt-BR"/>
               <a:t>Quarto nível</a:t>
             </a:r>
           </a:p>
           <a:p>
             <a:pPr lvl="4"/>
             <a:r>
-              <a:rPr lang="pt-BR" smtClean="0"/>
+              <a:rPr lang="pt-BR"/>
               <a:t>Quinto nível</a:t>
             </a:r>
             <a:endParaRPr lang="en-US" dirty="0"/>
@@ -1521,7 +1526,7 @@
           <a:p>
             <a:pPr lvl="0"/>
             <a:r>
-              <a:rPr lang="pt-BR" smtClean="0"/>
+              <a:rPr lang="pt-BR"/>
               <a:t>Clique para editar os estilos de texto mestres</a:t>
             </a:r>
           </a:p>
@@ -1549,35 +1554,35 @@
           <a:p>
             <a:pPr lvl="0"/>
             <a:r>
-              <a:rPr lang="pt-BR" smtClean="0"/>
+              <a:rPr lang="pt-BR"/>
               <a:t>Clique para editar os estilos de texto mestres</a:t>
             </a:r>
           </a:p>
           <a:p>
             <a:pPr lvl="1"/>
             <a:r>
-              <a:rPr lang="pt-BR" smtClean="0"/>
+              <a:rPr lang="pt-BR"/>
               <a:t>Segundo nível</a:t>
             </a:r>
           </a:p>
           <a:p>
             <a:pPr lvl="2"/>
             <a:r>
-              <a:rPr lang="pt-BR" smtClean="0"/>
+              <a:rPr lang="pt-BR"/>
               <a:t>Terceiro nível</a:t>
             </a:r>
           </a:p>
           <a:p>
             <a:pPr lvl="3"/>
             <a:r>
-              <a:rPr lang="pt-BR" smtClean="0"/>
+              <a:rPr lang="pt-BR"/>
               <a:t>Quarto nível</a:t>
             </a:r>
           </a:p>
           <a:p>
             <a:pPr lvl="4"/>
             <a:r>
-              <a:rPr lang="pt-BR" smtClean="0"/>
+              <a:rPr lang="pt-BR"/>
               <a:t>Quinto nível</a:t>
             </a:r>
             <a:endParaRPr lang="en-US" dirty="0"/>
@@ -1601,7 +1606,7 @@
           <a:p>
             <a:fld id="{A2012631-E70B-D040-BE44-60C2DACBB81E}" type="datetimeFigureOut">
               <a:rPr lang="pt-BR" smtClean="0"/>
-              <a:t>05/09/2019</a:t>
+              <a:t>07/09/2019</a:t>
             </a:fld>
             <a:endParaRPr lang="pt-BR"/>
           </a:p>
@@ -1643,7 +1648,7 @@
           <a:p>
             <a:fld id="{FA791A00-6D8C-5341-8E22-21E34B293C4C}" type="slidenum">
               <a:rPr lang="pt-BR" smtClean="0"/>
-              <a:t>‹n.º›</a:t>
+              <a:t>‹nº›</a:t>
             </a:fld>
             <a:endParaRPr lang="pt-BR"/>
           </a:p>
@@ -1695,7 +1700,7 @@
           <a:lstStyle/>
           <a:p>
             <a:r>
-              <a:rPr lang="pt-BR" smtClean="0"/>
+              <a:rPr lang="pt-BR"/>
               <a:t>Clique para editar estilo do título mestre</a:t>
             </a:r>
             <a:endParaRPr lang="en-US" dirty="0"/>
@@ -1719,7 +1724,7 @@
           <a:p>
             <a:fld id="{A2012631-E70B-D040-BE44-60C2DACBB81E}" type="datetimeFigureOut">
               <a:rPr lang="pt-BR" smtClean="0"/>
-              <a:t>05/09/2019</a:t>
+              <a:t>07/09/2019</a:t>
             </a:fld>
             <a:endParaRPr lang="pt-BR"/>
           </a:p>
@@ -1761,7 +1766,7 @@
           <a:p>
             <a:fld id="{FA791A00-6D8C-5341-8E22-21E34B293C4C}" type="slidenum">
               <a:rPr lang="pt-BR" smtClean="0"/>
-              <a:t>‹n.º›</a:t>
+              <a:t>‹nº›</a:t>
             </a:fld>
             <a:endParaRPr lang="pt-BR"/>
           </a:p>
@@ -1814,7 +1819,7 @@
           <a:p>
             <a:fld id="{A2012631-E70B-D040-BE44-60C2DACBB81E}" type="datetimeFigureOut">
               <a:rPr lang="pt-BR" smtClean="0"/>
-              <a:t>05/09/2019</a:t>
+              <a:t>07/09/2019</a:t>
             </a:fld>
             <a:endParaRPr lang="pt-BR"/>
           </a:p>
@@ -1856,7 +1861,7 @@
           <a:p>
             <a:fld id="{FA791A00-6D8C-5341-8E22-21E34B293C4C}" type="slidenum">
               <a:rPr lang="pt-BR" smtClean="0"/>
-              <a:t>‹n.º›</a:t>
+              <a:t>‹nº›</a:t>
             </a:fld>
             <a:endParaRPr lang="pt-BR"/>
           </a:p>
@@ -1917,7 +1922,7 @@
           </a:lstStyle>
           <a:p>
             <a:r>
-              <a:rPr lang="pt-BR" smtClean="0"/>
+              <a:rPr lang="pt-BR"/>
               <a:t>Clique para editar estilo do título mestre</a:t>
             </a:r>
             <a:endParaRPr lang="en-US" dirty="0"/>
@@ -1974,35 +1979,35 @@
           <a:p>
             <a:pPr lvl="0"/>
             <a:r>
-              <a:rPr lang="pt-BR" smtClean="0"/>
+              <a:rPr lang="pt-BR"/>
               <a:t>Clique para editar os estilos de texto mestres</a:t>
             </a:r>
           </a:p>
           <a:p>
             <a:pPr lvl="1"/>
             <a:r>
-              <a:rPr lang="pt-BR" smtClean="0"/>
+              <a:rPr lang="pt-BR"/>
               <a:t>Segundo nível</a:t>
             </a:r>
           </a:p>
           <a:p>
             <a:pPr lvl="2"/>
             <a:r>
-              <a:rPr lang="pt-BR" smtClean="0"/>
+              <a:rPr lang="pt-BR"/>
               <a:t>Terceiro nível</a:t>
             </a:r>
           </a:p>
           <a:p>
             <a:pPr lvl="3"/>
             <a:r>
-              <a:rPr lang="pt-BR" smtClean="0"/>
+              <a:rPr lang="pt-BR"/>
               <a:t>Quarto nível</a:t>
             </a:r>
           </a:p>
           <a:p>
             <a:pPr lvl="4"/>
             <a:r>
-              <a:rPr lang="pt-BR" smtClean="0"/>
+              <a:rPr lang="pt-BR"/>
               <a:t>Quinto nível</a:t>
             </a:r>
             <a:endParaRPr lang="en-US" dirty="0"/>
@@ -2068,7 +2073,7 @@
           <a:p>
             <a:pPr lvl="0"/>
             <a:r>
-              <a:rPr lang="pt-BR" smtClean="0"/>
+              <a:rPr lang="pt-BR"/>
               <a:t>Clique para editar os estilos de texto mestres</a:t>
             </a:r>
           </a:p>
@@ -2091,7 +2096,7 @@
           <a:p>
             <a:fld id="{A2012631-E70B-D040-BE44-60C2DACBB81E}" type="datetimeFigureOut">
               <a:rPr lang="pt-BR" smtClean="0"/>
-              <a:t>05/09/2019</a:t>
+              <a:t>07/09/2019</a:t>
             </a:fld>
             <a:endParaRPr lang="pt-BR"/>
           </a:p>
@@ -2133,7 +2138,7 @@
           <a:p>
             <a:fld id="{FA791A00-6D8C-5341-8E22-21E34B293C4C}" type="slidenum">
               <a:rPr lang="pt-BR" smtClean="0"/>
-              <a:t>‹n.º›</a:t>
+              <a:t>‹nº›</a:t>
             </a:fld>
             <a:endParaRPr lang="pt-BR"/>
           </a:p>
@@ -2194,7 +2199,7 @@
           </a:lstStyle>
           <a:p>
             <a:r>
-              <a:rPr lang="pt-BR" smtClean="0"/>
+              <a:rPr lang="pt-BR"/>
               <a:t>Clique para editar estilo do título mestre</a:t>
             </a:r>
             <a:endParaRPr lang="en-US" dirty="0"/>
@@ -2259,7 +2264,7 @@
           </a:lstStyle>
           <a:p>
             <a:r>
-              <a:rPr lang="pt-BR" smtClean="0"/>
+              <a:rPr lang="pt-BR"/>
               <a:t>Arraste a imagem para o espaço reservado ou clique no ícone para adicionar</a:t>
             </a:r>
             <a:endParaRPr lang="en-US" dirty="0"/>
@@ -2325,7 +2330,7 @@
           <a:p>
             <a:pPr lvl="0"/>
             <a:r>
-              <a:rPr lang="pt-BR" smtClean="0"/>
+              <a:rPr lang="pt-BR"/>
               <a:t>Clique para editar os estilos de texto mestres</a:t>
             </a:r>
           </a:p>
@@ -2348,7 +2353,7 @@
           <a:p>
             <a:fld id="{A2012631-E70B-D040-BE44-60C2DACBB81E}" type="datetimeFigureOut">
               <a:rPr lang="pt-BR" smtClean="0"/>
-              <a:t>05/09/2019</a:t>
+              <a:t>07/09/2019</a:t>
             </a:fld>
             <a:endParaRPr lang="pt-BR"/>
           </a:p>
@@ -2390,7 +2395,7 @@
           <a:p>
             <a:fld id="{FA791A00-6D8C-5341-8E22-21E34B293C4C}" type="slidenum">
               <a:rPr lang="pt-BR" smtClean="0"/>
-              <a:t>‹n.º›</a:t>
+              <a:t>‹nº›</a:t>
             </a:fld>
             <a:endParaRPr lang="pt-BR"/>
           </a:p>
@@ -2457,7 +2462,7 @@
           <a:lstStyle/>
           <a:p>
             <a:r>
-              <a:rPr lang="pt-BR" smtClean="0"/>
+              <a:rPr lang="pt-BR"/>
               <a:t>Clique para editar estilo do título mestre</a:t>
             </a:r>
             <a:endParaRPr lang="en-US" dirty="0"/>
@@ -2491,35 +2496,35 @@
           <a:p>
             <a:pPr lvl="0"/>
             <a:r>
-              <a:rPr lang="pt-BR" smtClean="0"/>
+              <a:rPr lang="pt-BR"/>
               <a:t>Clique para editar os estilos de texto mestres</a:t>
             </a:r>
           </a:p>
           <a:p>
             <a:pPr lvl="1"/>
             <a:r>
-              <a:rPr lang="pt-BR" smtClean="0"/>
+              <a:rPr lang="pt-BR"/>
               <a:t>Segundo nível</a:t>
             </a:r>
           </a:p>
           <a:p>
             <a:pPr lvl="2"/>
             <a:r>
-              <a:rPr lang="pt-BR" smtClean="0"/>
+              <a:rPr lang="pt-BR"/>
               <a:t>Terceiro nível</a:t>
             </a:r>
           </a:p>
           <a:p>
             <a:pPr lvl="3"/>
             <a:r>
-              <a:rPr lang="pt-BR" smtClean="0"/>
+              <a:rPr lang="pt-BR"/>
               <a:t>Quarto nível</a:t>
             </a:r>
           </a:p>
           <a:p>
             <a:pPr lvl="4"/>
             <a:r>
-              <a:rPr lang="pt-BR" smtClean="0"/>
+              <a:rPr lang="pt-BR"/>
               <a:t>Quinto nível</a:t>
             </a:r>
             <a:endParaRPr lang="en-US" dirty="0"/>
@@ -2561,7 +2566,7 @@
           <a:p>
             <a:fld id="{A2012631-E70B-D040-BE44-60C2DACBB81E}" type="datetimeFigureOut">
               <a:rPr lang="pt-BR" smtClean="0"/>
-              <a:t>05/09/2019</a:t>
+              <a:t>07/09/2019</a:t>
             </a:fld>
             <a:endParaRPr lang="pt-BR"/>
           </a:p>
@@ -2639,7 +2644,7 @@
           <a:p>
             <a:fld id="{FA791A00-6D8C-5341-8E22-21E34B293C4C}" type="slidenum">
               <a:rPr lang="pt-BR" smtClean="0"/>
-              <a:t>‹n.º›</a:t>
+              <a:t>‹nº›</a:t>
             </a:fld>
             <a:endParaRPr lang="pt-BR"/>
           </a:p>
@@ -3342,7 +3347,7 @@
         </p:blipFill>
         <p:spPr>
           <a:xfrm>
-            <a:off x="6293081" y="7745630"/>
+            <a:off x="4918251" y="7885330"/>
             <a:ext cx="1939749" cy="3709770"/>
           </a:xfrm>
           <a:prstGeom prst="rect">
@@ -3350,6 +3355,48 @@
           </a:prstGeom>
         </p:spPr>
       </p:pic>
+      <p:sp>
+        <p:nvSpPr>
+          <p:cNvPr id="2" name="Retângulo 1">
+            <a:extLst>
+              <a:ext uri="{FF2B5EF4-FFF2-40B4-BE49-F238E27FC236}">
+                <a16:creationId xmlns:a16="http://schemas.microsoft.com/office/drawing/2014/main" id="{4C5B8F80-259F-4BC2-9CF5-7EE41857C81E}"/>
+              </a:ext>
+            </a:extLst>
+          </p:cNvPr>
+          <p:cNvSpPr/>
+          <p:nvPr/>
+        </p:nvSpPr>
+        <p:spPr>
+          <a:xfrm>
+            <a:off x="375557" y="-33298"/>
+            <a:ext cx="6106887" cy="1107996"/>
+          </a:xfrm>
+          <a:prstGeom prst="rect">
+            <a:avLst/>
+          </a:prstGeom>
+        </p:spPr>
+        <p:txBody>
+          <a:bodyPr wrap="square">
+            <a:spAutoFit/>
+          </a:bodyPr>
+          <a:lstStyle/>
+          <a:p>
+            <a:pPr algn="ctr"/>
+            <a:r>
+              <a:rPr lang="pt-BR" sz="6600" dirty="0">
+                <a:solidFill>
+                  <a:schemeClr val="accent1">
+                    <a:lumMod val="75000"/>
+                  </a:schemeClr>
+                </a:solidFill>
+                <a:latin typeface="InkPen" panose="02000603000000000000" pitchFamily="50" charset="0"/>
+              </a:rPr>
+              <a:t>Ink Escape</a:t>
+            </a:r>
+          </a:p>
+        </p:txBody>
+      </p:sp>
     </p:spTree>
     <p:extLst>
       <p:ext uri="{BB962C8B-B14F-4D97-AF65-F5344CB8AC3E}">

</xml_diff>